<commit_message>
tinkered with figure designations; clarified some axis labels; re-running of figure code made new summary data CSVs
</commit_message>
<xml_diff>
--- a/figs/Figure_S2.pptx
+++ b/figs/Figure_S2.pptx
@@ -104,15 +104,113 @@
       </a:defRPr>
     </a:lvl9pPr>
   </p:defaultTextStyle>
+  <p:extLst>
+    <p:ext uri="{EFAFB233-063F-42B5-8137-9DF3F51BA10A}">
+      <p15:sldGuideLst xmlns:p15="http://schemas.microsoft.com/office/powerpoint/2012/main"/>
+    </p:ext>
+  </p:extLst>
 </p:presentation>
 </file>
 
 <file path=ppt/revisionInfo.xml><?xml version="1.0" encoding="utf-8"?>
 <p1510:revInfo xmlns:a="http://schemas.openxmlformats.org/drawingml/2006/main" xmlns:r="http://schemas.openxmlformats.org/officeDocument/2006/relationships" xmlns:p1510="http://schemas.microsoft.com/office/powerpoint/2015/10/main">
   <p1510:revLst>
-    <p1510:client id="{4A912282-483C-D146-A647-AACDD5A97745}" v="1" dt="2019-10-24T18:04:18.770"/>
+    <p1510:client id="{6E6C2291-1E56-2A4D-9B99-DCE2DDB47A58}" v="45" dt="2019-11-06T14:43:38.816"/>
   </p1510:revLst>
 </p1510:revInfo>
+</file>
+
+<file path=ppt/changesInfos/changesInfo1.xml><?xml version="1.0" encoding="utf-8"?>
+<pc:chgInfo xmlns:a="http://schemas.openxmlformats.org/drawingml/2006/main" xmlns:r="http://schemas.openxmlformats.org/officeDocument/2006/relationships" xmlns:ac="http://schemas.microsoft.com/office/drawing/2013/main/command" xmlns:pc="http://schemas.microsoft.com/office/powerpoint/2013/main/command">
+  <pc:docChgLst>
+    <pc:chgData name="Common, Jack" userId="09dffde3-d087-446d-a1a9-b8d8430819e1" providerId="ADAL" clId="{6E6C2291-1E56-2A4D-9B99-DCE2DDB47A58}"/>
+    <pc:docChg chg="modSld">
+      <pc:chgData name="Common, Jack" userId="09dffde3-d087-446d-a1a9-b8d8430819e1" providerId="ADAL" clId="{6E6C2291-1E56-2A4D-9B99-DCE2DDB47A58}" dt="2019-11-06T14:43:38.816" v="44"/>
+      <pc:docMkLst>
+        <pc:docMk/>
+      </pc:docMkLst>
+      <pc:sldChg chg="modSp">
+        <pc:chgData name="Common, Jack" userId="09dffde3-d087-446d-a1a9-b8d8430819e1" providerId="ADAL" clId="{6E6C2291-1E56-2A4D-9B99-DCE2DDB47A58}" dt="2019-11-06T14:43:38.816" v="44"/>
+        <pc:sldMkLst>
+          <pc:docMk/>
+          <pc:sldMk cId="3502052323" sldId="256"/>
+        </pc:sldMkLst>
+        <pc:spChg chg="mod">
+          <ac:chgData name="Common, Jack" userId="09dffde3-d087-446d-a1a9-b8d8430819e1" providerId="ADAL" clId="{6E6C2291-1E56-2A4D-9B99-DCE2DDB47A58}" dt="2019-11-06T14:42:31.505" v="8" actId="1076"/>
+          <ac:spMkLst>
+            <pc:docMk/>
+            <pc:sldMk cId="3502052323" sldId="256"/>
+            <ac:spMk id="183" creationId="{BFA7817E-E933-F548-A452-9F904557ED86}"/>
+          </ac:spMkLst>
+        </pc:spChg>
+        <pc:spChg chg="mod">
+          <ac:chgData name="Common, Jack" userId="09dffde3-d087-446d-a1a9-b8d8430819e1" providerId="ADAL" clId="{6E6C2291-1E56-2A4D-9B99-DCE2DDB47A58}" dt="2019-11-06T14:42:37.873" v="14" actId="1076"/>
+          <ac:spMkLst>
+            <pc:docMk/>
+            <pc:sldMk cId="3502052323" sldId="256"/>
+            <ac:spMk id="184" creationId="{7DF93CAF-CBE7-2B42-9371-16970632B1E7}"/>
+          </ac:spMkLst>
+        </pc:spChg>
+        <pc:spChg chg="mod">
+          <ac:chgData name="Common, Jack" userId="09dffde3-d087-446d-a1a9-b8d8430819e1" providerId="ADAL" clId="{6E6C2291-1E56-2A4D-9B99-DCE2DDB47A58}" dt="2019-11-06T14:43:18.464" v="33"/>
+          <ac:spMkLst>
+            <pc:docMk/>
+            <pc:sldMk cId="3502052323" sldId="256"/>
+            <ac:spMk id="185" creationId="{954C3BD7-9326-0C43-9DDC-48E7A79CE3EE}"/>
+          </ac:spMkLst>
+        </pc:spChg>
+        <pc:spChg chg="mod">
+          <ac:chgData name="Common, Jack" userId="09dffde3-d087-446d-a1a9-b8d8430819e1" providerId="ADAL" clId="{6E6C2291-1E56-2A4D-9B99-DCE2DDB47A58}" dt="2019-11-06T14:43:21.008" v="35"/>
+          <ac:spMkLst>
+            <pc:docMk/>
+            <pc:sldMk cId="3502052323" sldId="256"/>
+            <ac:spMk id="186" creationId="{984898C5-DBF9-7C4F-B54E-78EB6A7DC112}"/>
+          </ac:spMkLst>
+        </pc:spChg>
+        <pc:spChg chg="mod">
+          <ac:chgData name="Common, Jack" userId="09dffde3-d087-446d-a1a9-b8d8430819e1" providerId="ADAL" clId="{6E6C2291-1E56-2A4D-9B99-DCE2DDB47A58}" dt="2019-11-06T14:43:26.780" v="38"/>
+          <ac:spMkLst>
+            <pc:docMk/>
+            <pc:sldMk cId="3502052323" sldId="256"/>
+            <ac:spMk id="187" creationId="{2636DE85-383F-0549-AD05-8620708B3717}"/>
+          </ac:spMkLst>
+        </pc:spChg>
+        <pc:spChg chg="mod">
+          <ac:chgData name="Common, Jack" userId="09dffde3-d087-446d-a1a9-b8d8430819e1" providerId="ADAL" clId="{6E6C2291-1E56-2A4D-9B99-DCE2DDB47A58}" dt="2019-11-06T14:43:33.816" v="41"/>
+          <ac:spMkLst>
+            <pc:docMk/>
+            <pc:sldMk cId="3502052323" sldId="256"/>
+            <ac:spMk id="192" creationId="{6E12991B-FB74-C147-BF79-7D38806045A8}"/>
+          </ac:spMkLst>
+        </pc:spChg>
+        <pc:spChg chg="mod">
+          <ac:chgData name="Common, Jack" userId="09dffde3-d087-446d-a1a9-b8d8430819e1" providerId="ADAL" clId="{6E6C2291-1E56-2A4D-9B99-DCE2DDB47A58}" dt="2019-11-06T14:43:38.816" v="44"/>
+          <ac:spMkLst>
+            <pc:docMk/>
+            <pc:sldMk cId="3502052323" sldId="256"/>
+            <ac:spMk id="194" creationId="{9EEEBFC7-3F27-D44E-8EC3-57FB03A102D2}"/>
+          </ac:spMkLst>
+        </pc:spChg>
+        <pc:grpChg chg="mod">
+          <ac:chgData name="Common, Jack" userId="09dffde3-d087-446d-a1a9-b8d8430819e1" providerId="ADAL" clId="{6E6C2291-1E56-2A4D-9B99-DCE2DDB47A58}" dt="2019-11-06T14:43:33.816" v="41"/>
+          <ac:grpSpMkLst>
+            <pc:docMk/>
+            <pc:sldMk cId="3502052323" sldId="256"/>
+            <ac:grpSpMk id="195" creationId="{3E031438-2EFE-E244-A8F4-E95170BA1DF3}"/>
+          </ac:grpSpMkLst>
+        </pc:grpChg>
+        <pc:grpChg chg="mod">
+          <ac:chgData name="Common, Jack" userId="09dffde3-d087-446d-a1a9-b8d8430819e1" providerId="ADAL" clId="{6E6C2291-1E56-2A4D-9B99-DCE2DDB47A58}" dt="2019-11-06T14:43:38.816" v="44"/>
+          <ac:grpSpMkLst>
+            <pc:docMk/>
+            <pc:sldMk cId="3502052323" sldId="256"/>
+            <ac:grpSpMk id="196" creationId="{92567250-EF97-BE42-B082-2D1378E0F6A7}"/>
+          </ac:grpSpMkLst>
+        </pc:grpChg>
+      </pc:sldChg>
+    </pc:docChg>
+  </pc:docChgLst>
+</pc:chgInfo>
 </file>
 
 <file path=ppt/slideLayouts/slideLayout1.xml><?xml version="1.0" encoding="utf-8"?>
@@ -246,7 +344,7 @@
           <a:p>
             <a:fld id="{C786A958-B072-9C4C-A3E9-06E2C86E08B1}" type="datetimeFigureOut">
               <a:rPr lang="en-GB" smtClean="0"/>
-              <a:t>24/10/2019</a:t>
+              <a:t>06/11/2019</a:t>
             </a:fld>
             <a:endParaRPr lang="en-GB"/>
           </a:p>
@@ -416,7 +514,7 @@
           <a:p>
             <a:fld id="{C786A958-B072-9C4C-A3E9-06E2C86E08B1}" type="datetimeFigureOut">
               <a:rPr lang="en-GB" smtClean="0"/>
-              <a:t>24/10/2019</a:t>
+              <a:t>06/11/2019</a:t>
             </a:fld>
             <a:endParaRPr lang="en-GB"/>
           </a:p>
@@ -596,7 +694,7 @@
           <a:p>
             <a:fld id="{C786A958-B072-9C4C-A3E9-06E2C86E08B1}" type="datetimeFigureOut">
               <a:rPr lang="en-GB" smtClean="0"/>
-              <a:t>24/10/2019</a:t>
+              <a:t>06/11/2019</a:t>
             </a:fld>
             <a:endParaRPr lang="en-GB"/>
           </a:p>
@@ -766,7 +864,7 @@
           <a:p>
             <a:fld id="{C786A958-B072-9C4C-A3E9-06E2C86E08B1}" type="datetimeFigureOut">
               <a:rPr lang="en-GB" smtClean="0"/>
-              <a:t>24/10/2019</a:t>
+              <a:t>06/11/2019</a:t>
             </a:fld>
             <a:endParaRPr lang="en-GB"/>
           </a:p>
@@ -1010,7 +1108,7 @@
           <a:p>
             <a:fld id="{C786A958-B072-9C4C-A3E9-06E2C86E08B1}" type="datetimeFigureOut">
               <a:rPr lang="en-GB" smtClean="0"/>
-              <a:t>24/10/2019</a:t>
+              <a:t>06/11/2019</a:t>
             </a:fld>
             <a:endParaRPr lang="en-GB"/>
           </a:p>
@@ -1242,7 +1340,7 @@
           <a:p>
             <a:fld id="{C786A958-B072-9C4C-A3E9-06E2C86E08B1}" type="datetimeFigureOut">
               <a:rPr lang="en-GB" smtClean="0"/>
-              <a:t>24/10/2019</a:t>
+              <a:t>06/11/2019</a:t>
             </a:fld>
             <a:endParaRPr lang="en-GB"/>
           </a:p>
@@ -1609,7 +1707,7 @@
           <a:p>
             <a:fld id="{C786A958-B072-9C4C-A3E9-06E2C86E08B1}" type="datetimeFigureOut">
               <a:rPr lang="en-GB" smtClean="0"/>
-              <a:t>24/10/2019</a:t>
+              <a:t>06/11/2019</a:t>
             </a:fld>
             <a:endParaRPr lang="en-GB"/>
           </a:p>
@@ -1727,7 +1825,7 @@
           <a:p>
             <a:fld id="{C786A958-B072-9C4C-A3E9-06E2C86E08B1}" type="datetimeFigureOut">
               <a:rPr lang="en-GB" smtClean="0"/>
-              <a:t>24/10/2019</a:t>
+              <a:t>06/11/2019</a:t>
             </a:fld>
             <a:endParaRPr lang="en-GB"/>
           </a:p>
@@ -1822,7 +1920,7 @@
           <a:p>
             <a:fld id="{C786A958-B072-9C4C-A3E9-06E2C86E08B1}" type="datetimeFigureOut">
               <a:rPr lang="en-GB" smtClean="0"/>
-              <a:t>24/10/2019</a:t>
+              <a:t>06/11/2019</a:t>
             </a:fld>
             <a:endParaRPr lang="en-GB"/>
           </a:p>
@@ -2099,7 +2197,7 @@
           <a:p>
             <a:fld id="{C786A958-B072-9C4C-A3E9-06E2C86E08B1}" type="datetimeFigureOut">
               <a:rPr lang="en-GB" smtClean="0"/>
-              <a:t>24/10/2019</a:t>
+              <a:t>06/11/2019</a:t>
             </a:fld>
             <a:endParaRPr lang="en-GB"/>
           </a:p>
@@ -2356,7 +2454,7 @@
           <a:p>
             <a:fld id="{C786A958-B072-9C4C-A3E9-06E2C86E08B1}" type="datetimeFigureOut">
               <a:rPr lang="en-GB" smtClean="0"/>
-              <a:t>24/10/2019</a:t>
+              <a:t>06/11/2019</a:t>
             </a:fld>
             <a:endParaRPr lang="en-GB"/>
           </a:p>
@@ -2569,7 +2667,7 @@
           <a:p>
             <a:fld id="{C786A958-B072-9C4C-A3E9-06E2C86E08B1}" type="datetimeFigureOut">
               <a:rPr lang="en-GB" smtClean="0"/>
-              <a:t>24/10/2019</a:t>
+              <a:t>06/11/2019</a:t>
             </a:fld>
             <a:endParaRPr lang="en-GB"/>
           </a:p>
@@ -2989,9 +3087,9 @@
         <p:grpSpPr>
           <a:xfrm>
             <a:off x="338278" y="2218893"/>
-            <a:ext cx="6259666" cy="4085871"/>
+            <a:ext cx="6288452" cy="4085871"/>
             <a:chOff x="338278" y="2218893"/>
-            <a:chExt cx="6259666" cy="4085871"/>
+            <a:chExt cx="6288452" cy="4085871"/>
           </a:xfrm>
         </p:grpSpPr>
         <p:grpSp>
@@ -5409,8 +5507,8 @@
             </p:nvSpPr>
             <p:spPr>
               <a:xfrm>
-                <a:off x="469832" y="3902957"/>
-                <a:ext cx="789869" cy="646331"/>
+                <a:off x="479852" y="3794824"/>
+                <a:ext cx="789869" cy="923330"/>
               </a:xfrm>
               <a:prstGeom prst="rect">
                 <a:avLst/>
@@ -5457,6 +5555,32 @@
                   </a:rPr>
                   <a:t>1 escape phage</a:t>
                 </a:r>
+                <a:br>
+                  <a:rPr lang="en-GB" sz="900" dirty="0">
+                    <a:solidFill>
+                      <a:srgbClr val="0070C0"/>
+                    </a:solidFill>
+                    <a:latin typeface="Arial" panose="020B0604020202020204" pitchFamily="34" charset="0"/>
+                    <a:cs typeface="Arial" panose="020B0604020202020204" pitchFamily="34" charset="0"/>
+                  </a:rPr>
+                </a:br>
+                <a:r>
+                  <a:rPr lang="en-GB" sz="900" dirty="0">
+                    <a:latin typeface="Arial" panose="020B0604020202020204" pitchFamily="34" charset="0"/>
+                    <a:cs typeface="Arial" panose="020B0604020202020204" pitchFamily="34" charset="0"/>
+                  </a:rPr>
+                  <a:t>+</a:t>
+                </a:r>
+              </a:p>
+              <a:p>
+                <a:pPr algn="ctr"/>
+                <a:r>
+                  <a:rPr lang="en-GB" sz="900" dirty="0">
+                    <a:latin typeface="Arial" panose="020B0604020202020204" pitchFamily="34" charset="0"/>
+                    <a:cs typeface="Arial" panose="020B0604020202020204" pitchFamily="34" charset="0"/>
+                  </a:rPr>
+                  <a:t>SM</a:t>
+                </a:r>
               </a:p>
             </p:txBody>
           </p:sp>
@@ -5474,8 +5598,8 @@
             </p:nvSpPr>
             <p:spPr>
               <a:xfrm>
-                <a:off x="1453769" y="3907256"/>
-                <a:ext cx="789869" cy="646331"/>
+                <a:off x="1461461" y="3805088"/>
+                <a:ext cx="789869" cy="923330"/>
               </a:xfrm>
               <a:prstGeom prst="rect">
                 <a:avLst/>
@@ -5517,6 +5641,26 @@
                   <a:t>ancestral phage</a:t>
                 </a:r>
               </a:p>
+              <a:p>
+                <a:pPr algn="ctr"/>
+                <a:r>
+                  <a:rPr lang="en-GB" sz="900" dirty="0">
+                    <a:latin typeface="Arial" panose="020B0604020202020204" pitchFamily="34" charset="0"/>
+                    <a:cs typeface="Arial" panose="020B0604020202020204" pitchFamily="34" charset="0"/>
+                  </a:rPr>
+                  <a:t>+</a:t>
+                </a:r>
+              </a:p>
+              <a:p>
+                <a:pPr algn="ctr"/>
+                <a:r>
+                  <a:rPr lang="en-GB" sz="900" dirty="0">
+                    <a:latin typeface="Arial" panose="020B0604020202020204" pitchFamily="34" charset="0"/>
+                    <a:cs typeface="Arial" panose="020B0604020202020204" pitchFamily="34" charset="0"/>
+                  </a:rPr>
+                  <a:t>SM</a:t>
+                </a:r>
+              </a:p>
             </p:txBody>
           </p:sp>
           <p:sp>
@@ -5533,8 +5677,8 @@
             </p:nvSpPr>
             <p:spPr>
               <a:xfrm>
-                <a:off x="2317248" y="3740588"/>
-                <a:ext cx="840467" cy="923330"/>
+                <a:off x="2314249" y="3511845"/>
+                <a:ext cx="840467" cy="1338828"/>
               </a:xfrm>
               <a:prstGeom prst="rect">
                 <a:avLst/>
@@ -5622,6 +5766,40 @@
                   <a:t>1 escape phage</a:t>
                 </a:r>
               </a:p>
+              <a:p>
+                <a:pPr algn="ctr"/>
+                <a:r>
+                  <a:rPr lang="en-GB" sz="900" dirty="0">
+                    <a:latin typeface="Arial" panose="020B0604020202020204" pitchFamily="34" charset="0"/>
+                    <a:cs typeface="Arial" panose="020B0604020202020204" pitchFamily="34" charset="0"/>
+                  </a:rPr>
+                  <a:t>+</a:t>
+                </a:r>
+              </a:p>
+              <a:p>
+                <a:pPr algn="ctr"/>
+                <a:r>
+                  <a:rPr lang="en-GB" sz="900" dirty="0">
+                    <a:latin typeface="Arial" panose="020B0604020202020204" pitchFamily="34" charset="0"/>
+                    <a:cs typeface="Arial" panose="020B0604020202020204" pitchFamily="34" charset="0"/>
+                  </a:rPr>
+                  <a:t>SM</a:t>
+                </a:r>
+                <a:endParaRPr lang="en-GB" sz="900" dirty="0">
+                  <a:solidFill>
+                    <a:srgbClr val="0070C0"/>
+                  </a:solidFill>
+                  <a:latin typeface="Arial" panose="020B0604020202020204" pitchFamily="34" charset="0"/>
+                  <a:cs typeface="Arial" panose="020B0604020202020204" pitchFamily="34" charset="0"/>
+                </a:endParaRPr>
+              </a:p>
+              <a:p>
+                <a:pPr algn="ctr"/>
+                <a:endParaRPr lang="en-GB" sz="900" dirty="0">
+                  <a:latin typeface="Arial" panose="020B0604020202020204" pitchFamily="34" charset="0"/>
+                  <a:cs typeface="Arial" panose="020B0604020202020204" pitchFamily="34" charset="0"/>
+                </a:endParaRPr>
+              </a:p>
             </p:txBody>
           </p:sp>
           <p:sp>
@@ -5638,8 +5816,8 @@
             </p:nvSpPr>
             <p:spPr>
               <a:xfrm>
-                <a:off x="3237538" y="3757508"/>
-                <a:ext cx="840467" cy="923330"/>
+                <a:off x="3264803" y="3509853"/>
+                <a:ext cx="840467" cy="1200329"/>
               </a:xfrm>
               <a:prstGeom prst="rect">
                 <a:avLst/>
@@ -5727,6 +5905,33 @@
                   <a:t>1 escape phage</a:t>
                 </a:r>
               </a:p>
+              <a:p>
+                <a:pPr algn="ctr"/>
+                <a:r>
+                  <a:rPr lang="en-GB" sz="900" dirty="0">
+                    <a:latin typeface="Arial" panose="020B0604020202020204" pitchFamily="34" charset="0"/>
+                    <a:cs typeface="Arial" panose="020B0604020202020204" pitchFamily="34" charset="0"/>
+                  </a:rPr>
+                  <a:t>+</a:t>
+                </a:r>
+              </a:p>
+              <a:p>
+                <a:pPr algn="ctr"/>
+                <a:r>
+                  <a:rPr lang="en-GB" sz="900" dirty="0">
+                    <a:latin typeface="Arial" panose="020B0604020202020204" pitchFamily="34" charset="0"/>
+                    <a:cs typeface="Arial" panose="020B0604020202020204" pitchFamily="34" charset="0"/>
+                  </a:rPr>
+                  <a:t>SM</a:t>
+                </a:r>
+                <a:endParaRPr lang="en-GB" sz="900" dirty="0">
+                  <a:solidFill>
+                    <a:srgbClr val="0070C0"/>
+                  </a:solidFill>
+                  <a:latin typeface="Arial" panose="020B0604020202020204" pitchFamily="34" charset="0"/>
+                  <a:cs typeface="Arial" panose="020B0604020202020204" pitchFamily="34" charset="0"/>
+                </a:endParaRPr>
+              </a:p>
             </p:txBody>
           </p:sp>
           <p:sp>
@@ -5743,8 +5948,8 @@
             </p:nvSpPr>
             <p:spPr>
               <a:xfrm>
-                <a:off x="4140924" y="3742095"/>
-                <a:ext cx="840467" cy="923330"/>
+                <a:off x="4126532" y="3500633"/>
+                <a:ext cx="840467" cy="1200329"/>
               </a:xfrm>
               <a:prstGeom prst="rect">
                 <a:avLst/>
@@ -5832,6 +6037,33 @@
                   <a:t>1 escape phage</a:t>
                 </a:r>
               </a:p>
+              <a:p>
+                <a:pPr algn="ctr"/>
+                <a:r>
+                  <a:rPr lang="en-GB" sz="900" dirty="0">
+                    <a:latin typeface="Arial" panose="020B0604020202020204" pitchFamily="34" charset="0"/>
+                    <a:cs typeface="Arial" panose="020B0604020202020204" pitchFamily="34" charset="0"/>
+                  </a:rPr>
+                  <a:t>+</a:t>
+                </a:r>
+              </a:p>
+              <a:p>
+                <a:pPr algn="ctr"/>
+                <a:r>
+                  <a:rPr lang="en-GB" sz="900" dirty="0">
+                    <a:latin typeface="Arial" panose="020B0604020202020204" pitchFamily="34" charset="0"/>
+                    <a:cs typeface="Arial" panose="020B0604020202020204" pitchFamily="34" charset="0"/>
+                  </a:rPr>
+                  <a:t>SM</a:t>
+                </a:r>
+                <a:endParaRPr lang="en-GB" sz="900" dirty="0">
+                  <a:solidFill>
+                    <a:srgbClr val="0070C0"/>
+                  </a:solidFill>
+                  <a:latin typeface="Arial" panose="020B0604020202020204" pitchFamily="34" charset="0"/>
+                  <a:cs typeface="Arial" panose="020B0604020202020204" pitchFamily="34" charset="0"/>
+                </a:endParaRPr>
+              </a:p>
             </p:txBody>
           </p:sp>
           <p:sp>
@@ -5848,8 +6080,8 @@
             </p:nvSpPr>
             <p:spPr>
               <a:xfrm>
-                <a:off x="4981391" y="3723030"/>
-                <a:ext cx="840467" cy="923330"/>
+                <a:off x="4995784" y="3486175"/>
+                <a:ext cx="840467" cy="1200329"/>
               </a:xfrm>
               <a:prstGeom prst="rect">
                 <a:avLst/>
@@ -5937,6 +6169,33 @@
                   <a:t>1 escape phage</a:t>
                 </a:r>
               </a:p>
+              <a:p>
+                <a:pPr algn="ctr"/>
+                <a:r>
+                  <a:rPr lang="en-GB" sz="900" dirty="0">
+                    <a:latin typeface="Arial" panose="020B0604020202020204" pitchFamily="34" charset="0"/>
+                    <a:cs typeface="Arial" panose="020B0604020202020204" pitchFamily="34" charset="0"/>
+                  </a:rPr>
+                  <a:t>+</a:t>
+                </a:r>
+              </a:p>
+              <a:p>
+                <a:pPr algn="ctr"/>
+                <a:r>
+                  <a:rPr lang="en-GB" sz="900" dirty="0">
+                    <a:latin typeface="Arial" panose="020B0604020202020204" pitchFamily="34" charset="0"/>
+                    <a:cs typeface="Arial" panose="020B0604020202020204" pitchFamily="34" charset="0"/>
+                  </a:rPr>
+                  <a:t>SM</a:t>
+                </a:r>
+                <a:endParaRPr lang="en-GB" sz="900" dirty="0">
+                  <a:solidFill>
+                    <a:srgbClr val="0070C0"/>
+                  </a:solidFill>
+                  <a:latin typeface="Arial" panose="020B0604020202020204" pitchFamily="34" charset="0"/>
+                  <a:cs typeface="Arial" panose="020B0604020202020204" pitchFamily="34" charset="0"/>
+                </a:endParaRPr>
+              </a:p>
             </p:txBody>
           </p:sp>
         </p:grpSp>
@@ -5954,8 +6213,8 @@
           </p:nvSpPr>
           <p:spPr>
             <a:xfrm>
-              <a:off x="5757477" y="3730882"/>
-              <a:ext cx="840467" cy="923330"/>
+              <a:off x="5786263" y="3483378"/>
+              <a:ext cx="840467" cy="1200329"/>
             </a:xfrm>
             <a:prstGeom prst="rect">
               <a:avLst/>
@@ -6038,6 +6297,26 @@
                   <a:cs typeface="Arial" panose="020B0604020202020204" pitchFamily="34" charset="0"/>
                 </a:rPr>
                 <a:t>ancestral phage</a:t>
+              </a:r>
+            </a:p>
+            <a:p>
+              <a:pPr algn="ctr"/>
+              <a:r>
+                <a:rPr lang="en-GB" sz="900" dirty="0">
+                  <a:latin typeface="Arial" panose="020B0604020202020204" pitchFamily="34" charset="0"/>
+                  <a:cs typeface="Arial" panose="020B0604020202020204" pitchFamily="34" charset="0"/>
+                </a:rPr>
+                <a:t>+</a:t>
+              </a:r>
+            </a:p>
+            <a:p>
+              <a:pPr algn="ctr"/>
+              <a:r>
+                <a:rPr lang="en-GB" sz="900" dirty="0">
+                  <a:latin typeface="Arial" panose="020B0604020202020204" pitchFamily="34" charset="0"/>
+                  <a:cs typeface="Arial" panose="020B0604020202020204" pitchFamily="34" charset="0"/>
+                </a:rPr>
+                <a:t>SM</a:t>
               </a:r>
             </a:p>
           </p:txBody>

</xml_diff>